<commit_message>
First cut at combined viewing with all inputs vetted
First cut at combined viewing with all inputs vetted
</commit_message>
<xml_diff>
--- a/FAST and IMAGE Coincident Viewing 2.pptx
+++ b/FAST and IMAGE Coincident Viewing 2.pptx
@@ -9,6 +9,7 @@
     <p:sldId id="257" r:id="rId3"/>
     <p:sldId id="258" r:id="rId4"/>
     <p:sldId id="260" r:id="rId5"/>
+    <p:sldId id="261" r:id="rId6"/>
   </p:sldIdLst>
   <p:sldSz cx="9144000" cy="6858000" type="screen4x3"/>
   <p:notesSz cx="6858000" cy="9144000"/>
@@ -291,7 +292,7 @@
           <a:p>
             <a:fld id="{265BC65D-ACAE-4D79-8550-30F1A450692D}" type="datetimeFigureOut">
               <a:rPr lang="en-US" smtClean="0"/>
-              <a:t>11/13/2016</a:t>
+              <a:t>11/16/2016</a:t>
             </a:fld>
             <a:endParaRPr lang="en-US"/>
           </a:p>
@@ -456,7 +457,7 @@
           <a:p>
             <a:fld id="{265BC65D-ACAE-4D79-8550-30F1A450692D}" type="datetimeFigureOut">
               <a:rPr lang="en-US" smtClean="0"/>
-              <a:t>11/13/2016</a:t>
+              <a:t>11/16/2016</a:t>
             </a:fld>
             <a:endParaRPr lang="en-US"/>
           </a:p>
@@ -631,7 +632,7 @@
           <a:p>
             <a:fld id="{265BC65D-ACAE-4D79-8550-30F1A450692D}" type="datetimeFigureOut">
               <a:rPr lang="en-US" smtClean="0"/>
-              <a:t>11/13/2016</a:t>
+              <a:t>11/16/2016</a:t>
             </a:fld>
             <a:endParaRPr lang="en-US"/>
           </a:p>
@@ -796,7 +797,7 @@
           <a:p>
             <a:fld id="{265BC65D-ACAE-4D79-8550-30F1A450692D}" type="datetimeFigureOut">
               <a:rPr lang="en-US" smtClean="0"/>
-              <a:t>11/13/2016</a:t>
+              <a:t>11/16/2016</a:t>
             </a:fld>
             <a:endParaRPr lang="en-US"/>
           </a:p>
@@ -1037,7 +1038,7 @@
           <a:p>
             <a:fld id="{265BC65D-ACAE-4D79-8550-30F1A450692D}" type="datetimeFigureOut">
               <a:rPr lang="en-US" smtClean="0"/>
-              <a:t>11/13/2016</a:t>
+              <a:t>11/16/2016</a:t>
             </a:fld>
             <a:endParaRPr lang="en-US"/>
           </a:p>
@@ -1320,7 +1321,7 @@
           <a:p>
             <a:fld id="{265BC65D-ACAE-4D79-8550-30F1A450692D}" type="datetimeFigureOut">
               <a:rPr lang="en-US" smtClean="0"/>
-              <a:t>11/13/2016</a:t>
+              <a:t>11/16/2016</a:t>
             </a:fld>
             <a:endParaRPr lang="en-US"/>
           </a:p>
@@ -1737,7 +1738,7 @@
           <a:p>
             <a:fld id="{265BC65D-ACAE-4D79-8550-30F1A450692D}" type="datetimeFigureOut">
               <a:rPr lang="en-US" smtClean="0"/>
-              <a:t>11/13/2016</a:t>
+              <a:t>11/16/2016</a:t>
             </a:fld>
             <a:endParaRPr lang="en-US"/>
           </a:p>
@@ -1850,7 +1851,7 @@
           <a:p>
             <a:fld id="{265BC65D-ACAE-4D79-8550-30F1A450692D}" type="datetimeFigureOut">
               <a:rPr lang="en-US" smtClean="0"/>
-              <a:t>11/13/2016</a:t>
+              <a:t>11/16/2016</a:t>
             </a:fld>
             <a:endParaRPr lang="en-US"/>
           </a:p>
@@ -1940,7 +1941,7 @@
           <a:p>
             <a:fld id="{265BC65D-ACAE-4D79-8550-30F1A450692D}" type="datetimeFigureOut">
               <a:rPr lang="en-US" smtClean="0"/>
-              <a:t>11/13/2016</a:t>
+              <a:t>11/16/2016</a:t>
             </a:fld>
             <a:endParaRPr lang="en-US"/>
           </a:p>
@@ -2212,7 +2213,7 @@
           <a:p>
             <a:fld id="{265BC65D-ACAE-4D79-8550-30F1A450692D}" type="datetimeFigureOut">
               <a:rPr lang="en-US" smtClean="0"/>
-              <a:t>11/13/2016</a:t>
+              <a:t>11/16/2016</a:t>
             </a:fld>
             <a:endParaRPr lang="en-US"/>
           </a:p>
@@ -2460,7 +2461,7 @@
           <a:p>
             <a:fld id="{265BC65D-ACAE-4D79-8550-30F1A450692D}" type="datetimeFigureOut">
               <a:rPr lang="en-US" smtClean="0"/>
-              <a:t>11/13/2016</a:t>
+              <a:t>11/16/2016</a:t>
             </a:fld>
             <a:endParaRPr lang="en-US"/>
           </a:p>
@@ -2668,7 +2669,7 @@
           <a:p>
             <a:fld id="{265BC65D-ACAE-4D79-8550-30F1A450692D}" type="datetimeFigureOut">
               <a:rPr lang="en-US" smtClean="0"/>
-              <a:t>11/13/2016</a:t>
+              <a:t>11/16/2016</a:t>
             </a:fld>
             <a:endParaRPr lang="en-US"/>
           </a:p>
@@ -3191,30 +3192,14 @@
             <a:pPr lvl="1"/>
             <a:r>
               <a:rPr lang="en-US" dirty="0" smtClean="0"/>
-              <a:t>Time span: 1996 234 10:30:00.000 to </a:t>
-            </a:r>
+              <a:t>Time span: 1996 234 10:30:00.000 to 2009 121 02:26:49.990</a:t>
+            </a:r>
+          </a:p>
+          <a:p>
+            <a:pPr lvl="1"/>
             <a:r>
               <a:rPr lang="en-US" dirty="0" smtClean="0"/>
-              <a:t>2009 121 </a:t>
-            </a:r>
-            <a:r>
-              <a:rPr lang="en-US" dirty="0" smtClean="0"/>
-              <a:t>02:26:49.990</a:t>
-            </a:r>
-          </a:p>
-          <a:p>
-            <a:pPr lvl="1"/>
-            <a:r>
-              <a:rPr lang="en-US" dirty="0" smtClean="0"/>
-              <a:t>SMA </a:t>
-            </a:r>
-            <a:r>
-              <a:rPr lang="en-US" dirty="0" smtClean="0"/>
-              <a:t>= 8300, ECC = 0.1898; INC = 82.97 (all the rest variable</a:t>
-            </a:r>
-            <a:r>
-              <a:rPr lang="en-US" dirty="0" smtClean="0"/>
-              <a:t>)</a:t>
+              <a:t>SMA = 8300, ECC = 0.1898; INC = 82.97 (all the rest variable)</a:t>
             </a:r>
           </a:p>
           <a:p>
@@ -3247,7 +3232,6 @@
               <a:rPr lang="en-US" dirty="0" smtClean="0"/>
               <a:t>/day</a:t>
             </a:r>
-            <a:endParaRPr lang="en-US" dirty="0" smtClean="0"/>
           </a:p>
           <a:p>
             <a:pPr lvl="1"/>
@@ -3300,11 +3284,7 @@
             <a:pPr lvl="1"/>
             <a:r>
               <a:rPr lang="en-US" dirty="0" smtClean="0"/>
-              <a:t>SMA </a:t>
-            </a:r>
-            <a:r>
-              <a:rPr lang="en-US" dirty="0" smtClean="0"/>
-              <a:t>= 29,815.4; ECC = 0.7531; INC = 90.010 (all the rest variable)</a:t>
+              <a:t>SMA = 29,815.4; ECC = 0.7531; INC = 90.010 (all the rest variable)</a:t>
             </a:r>
             <a:endParaRPr lang="en-US" dirty="0"/>
           </a:p>
@@ -3392,19 +3372,7 @@
           <a:p>
             <a:r>
               <a:rPr lang="en-US" dirty="0" smtClean="0"/>
-              <a:t>IMAGE </a:t>
-            </a:r>
-            <a:r>
-              <a:rPr lang="en-US" dirty="0" smtClean="0"/>
-              <a:t>Epoch </a:t>
-            </a:r>
-            <a:r>
-              <a:rPr lang="en-US" dirty="0" smtClean="0"/>
-              <a:t>Filtering </a:t>
-            </a:r>
-            <a:r>
-              <a:rPr lang="en-US" dirty="0" smtClean="0"/>
-              <a:t>Strategy</a:t>
+              <a:t>IMAGE Epoch Filtering Strategy</a:t>
             </a:r>
             <a:endParaRPr lang="en-US" dirty="0"/>
           </a:p>
@@ -3436,8 +3404,8 @@
           <a:noFill/>
         </p:spPr>
       </p:pic>
-      <mc:AlternateContent xmlns:mc="http://schemas.openxmlformats.org/markup-compatibility/2006">
-        <mc:Choice xmlns:a14="http://schemas.microsoft.com/office/drawing/2010/main" Requires="a14">
+      <mc:AlternateContent xmlns:mc="http://schemas.openxmlformats.org/markup-compatibility/2006" xmlns:a14="http://schemas.microsoft.com/office/drawing/2010/main">
+        <mc:Choice Requires="a14">
           <p:sp>
             <p:nvSpPr>
               <p:cNvPr id="11" name="Content Placeholder 10"/>
@@ -3462,21 +3430,13 @@
               <a:p>
                 <a:r>
                   <a:rPr lang="en-US" dirty="0" smtClean="0"/>
-                  <a:t>Want time spans when IMAGE </a:t>
-                </a:r>
-                <a:r>
-                  <a:rPr lang="en-US" dirty="0" smtClean="0"/>
-                  <a:t>is within 30 degrees of apogee</a:t>
+                  <a:t>Want time spans when IMAGE is within 30 degrees of apogee</a:t>
                 </a:r>
               </a:p>
               <a:p>
                 <a:r>
                   <a:rPr lang="en-US" dirty="0" smtClean="0"/>
-                  <a:t>Define ‘apogee’ </a:t>
-                </a:r>
-                <a:r>
-                  <a:rPr lang="en-US" dirty="0" smtClean="0"/>
-                  <a:t>vector </a:t>
+                  <a:t>Define ‘apogee’ vector </a:t>
                 </a:r>
                 <a14:m>
                   <m:oMath xmlns:m="http://schemas.openxmlformats.org/officeDocument/2006/math">
@@ -3642,7 +3602,6 @@
                   <a:rPr lang="en-US" dirty="0" smtClean="0"/>
                   <a:t> and filter</a:t>
                 </a:r>
-                <a:endParaRPr lang="en-US" dirty="0" smtClean="0"/>
               </a:p>
               <a:p>
                 <a:pPr>
@@ -3653,7 +3612,7 @@
             </p:txBody>
           </p:sp>
         </mc:Choice>
-        <mc:Fallback>
+        <mc:Fallback xmlns="">
           <p:sp>
             <p:nvSpPr>
               <p:cNvPr id="11" name="Content Placeholder 10"/>
@@ -3861,8 +3820,8 @@
           </a:p>
         </p:txBody>
       </p:sp>
-      <mc:AlternateContent xmlns:mc="http://schemas.openxmlformats.org/markup-compatibility/2006">
-        <mc:Choice xmlns:a14="http://schemas.microsoft.com/office/drawing/2010/main" Requires="a14">
+      <mc:AlternateContent xmlns:mc="http://schemas.openxmlformats.org/markup-compatibility/2006" xmlns:a14="http://schemas.microsoft.com/office/drawing/2010/main">
+        <mc:Choice Requires="a14">
           <p:sp>
             <p:nvSpPr>
               <p:cNvPr id="24" name="TextBox 23"/>
@@ -3997,7 +3956,7 @@
             </p:txBody>
           </p:sp>
         </mc:Choice>
-        <mc:Fallback>
+        <mc:Fallback xmlns="">
           <p:sp>
             <p:nvSpPr>
               <p:cNvPr id="24" name="TextBox 23"/>
@@ -4036,8 +3995,8 @@
           </p:sp>
         </mc:Fallback>
       </mc:AlternateContent>
-      <mc:AlternateContent xmlns:mc="http://schemas.openxmlformats.org/markup-compatibility/2006">
-        <mc:Choice xmlns:a14="http://schemas.microsoft.com/office/drawing/2010/main" Requires="a14">
+      <mc:AlternateContent xmlns:mc="http://schemas.openxmlformats.org/markup-compatibility/2006" xmlns:a14="http://schemas.microsoft.com/office/drawing/2010/main">
+        <mc:Choice Requires="a14">
           <p:sp>
             <p:nvSpPr>
               <p:cNvPr id="23" name="Rectangle 22"/>
@@ -4059,6 +4018,7 @@
               </a:bodyPr>
               <a:lstStyle/>
               <a:p>
+                <a:pPr/>
                 <a14:m>
                   <m:oMathPara xmlns:m="http://schemas.openxmlformats.org/officeDocument/2006/math">
                     <m:oMathParaPr>
@@ -4082,7 +4042,7 @@
             </p:txBody>
           </p:sp>
         </mc:Choice>
-        <mc:Fallback>
+        <mc:Fallback xmlns="">
           <p:sp>
             <p:nvSpPr>
               <p:cNvPr id="23" name="Rectangle 22"/>
@@ -4121,8 +4081,8 @@
           </p:sp>
         </mc:Fallback>
       </mc:AlternateContent>
-      <mc:AlternateContent xmlns:mc="http://schemas.openxmlformats.org/markup-compatibility/2006">
-        <mc:Choice xmlns:a14="http://schemas.microsoft.com/office/drawing/2010/main" Requires="a14">
+      <mc:AlternateContent xmlns:mc="http://schemas.openxmlformats.org/markup-compatibility/2006" xmlns:a14="http://schemas.microsoft.com/office/drawing/2010/main">
+        <mc:Choice Requires="a14">
           <p:sp>
             <p:nvSpPr>
               <p:cNvPr id="25" name="Rectangle 24"/>
@@ -4144,6 +4104,7 @@
               </a:bodyPr>
               <a:lstStyle/>
               <a:p>
+                <a:pPr/>
                 <a14:m>
                   <m:oMathPara xmlns:m="http://schemas.openxmlformats.org/officeDocument/2006/math">
                     <m:oMathParaPr>
@@ -4191,7 +4152,7 @@
             </p:txBody>
           </p:sp>
         </mc:Choice>
-        <mc:Fallback>
+        <mc:Fallback xmlns="">
           <p:sp>
             <p:nvSpPr>
               <p:cNvPr id="25" name="Rectangle 24"/>
@@ -4230,8 +4191,8 @@
           </p:sp>
         </mc:Fallback>
       </mc:AlternateContent>
-      <mc:AlternateContent xmlns:mc="http://schemas.openxmlformats.org/markup-compatibility/2006">
-        <mc:Choice xmlns:a14="http://schemas.microsoft.com/office/drawing/2010/main" Requires="a14">
+      <mc:AlternateContent xmlns:mc="http://schemas.openxmlformats.org/markup-compatibility/2006" xmlns:a14="http://schemas.microsoft.com/office/drawing/2010/main">
+        <mc:Choice Requires="a14">
           <p:sp>
             <p:nvSpPr>
               <p:cNvPr id="26" name="Rectangle 25"/>
@@ -4253,6 +4214,7 @@
               </a:bodyPr>
               <a:lstStyle/>
               <a:p>
+                <a:pPr/>
                 <a14:m>
                   <m:oMathPara xmlns:m="http://schemas.openxmlformats.org/officeDocument/2006/math">
                     <m:oMathParaPr>
@@ -4291,7 +4253,7 @@
             </p:txBody>
           </p:sp>
         </mc:Choice>
-        <mc:Fallback>
+        <mc:Fallback xmlns="">
           <p:sp>
             <p:nvSpPr>
               <p:cNvPr id="26" name="Rectangle 25"/>
@@ -4410,19 +4372,7 @@
           <a:p>
             <a:r>
               <a:rPr lang="en-US" dirty="0" smtClean="0"/>
-              <a:t>FAST </a:t>
-            </a:r>
-            <a:r>
-              <a:rPr lang="en-US" dirty="0" smtClean="0"/>
-              <a:t>Epoch </a:t>
-            </a:r>
-            <a:r>
-              <a:rPr lang="en-US" dirty="0" smtClean="0"/>
-              <a:t>Filtering </a:t>
-            </a:r>
-            <a:r>
-              <a:rPr lang="en-US" dirty="0" smtClean="0"/>
-              <a:t>Strategy</a:t>
+              <a:t>FAST Epoch Filtering Strategy</a:t>
             </a:r>
             <a:endParaRPr lang="en-US" dirty="0"/>
           </a:p>
@@ -4448,7 +4398,7 @@
             </p:spPr>
             <p:txBody>
               <a:bodyPr>
-                <a:normAutofit fontScale="55000" lnSpcReduction="20000"/>
+                <a:normAutofit fontScale="40000" lnSpcReduction="20000"/>
               </a:bodyPr>
               <a:lstStyle/>
               <a:p>
@@ -4605,7 +4555,6 @@
                   <a:rPr lang="en-US" dirty="0" smtClean="0"/>
                   <a:t>Convert ECI components to SM and calculate corresponding SMLT</a:t>
                 </a:r>
-                <a:endParaRPr lang="en-US" dirty="0" smtClean="0"/>
               </a:p>
               <a:p>
                 <a:endParaRPr lang="en-US" dirty="0" smtClean="0"/>
@@ -4639,7 +4588,11 @@
                 </a14:m>
                 <a:r>
                   <a:rPr lang="en-US" dirty="0" smtClean="0"/>
-                  <a:t>) lies either in</a:t>
+                  <a:t>) lies either </a:t>
+                </a:r>
+                <a:r>
+                  <a:rPr lang="en-US" dirty="0" smtClean="0"/>
+                  <a:t>in</a:t>
                 </a:r>
               </a:p>
               <a:p>
@@ -4648,7 +4601,7 @@
                   <a:buAutoNum type="arabicPeriod"/>
                 </a:pPr>
                 <a:r>
-                  <a:rPr lang="en-US" dirty="0" smtClean="0"/>
+                  <a:rPr lang="en-US" dirty="0"/>
                   <a:t>02:00-08:00</a:t>
                 </a:r>
               </a:p>
@@ -4658,9 +4611,163 @@
                   <a:buAutoNum type="arabicPeriod"/>
                 </a:pPr>
                 <a:r>
-                  <a:rPr lang="en-US" dirty="0" smtClean="0"/>
+                  <a:rPr lang="en-US" dirty="0"/>
                   <a:t>14:00-20:00</a:t>
                 </a:r>
+              </a:p>
+              <a:p>
+                <a:endParaRPr lang="en-US" dirty="0" smtClean="0"/>
+              </a:p>
+              <a:p>
+                <a:r>
+                  <a:rPr lang="en-US" dirty="0" smtClean="0"/>
+                  <a:t>Sanity check:  note </a:t>
+                </a:r>
+                <a:r>
+                  <a:rPr lang="en-US" dirty="0"/>
+                  <a:t>that the grey and white regions are each 6-hours in local </a:t>
+                </a:r>
+                <a:r>
+                  <a:rPr lang="en-US" dirty="0" smtClean="0"/>
+                  <a:t>time</a:t>
+                </a:r>
+              </a:p>
+              <a:p>
+                <a:pPr lvl="1"/>
+                <a:r>
+                  <a:rPr lang="en-US" dirty="0" smtClean="0"/>
+                  <a:t>Pattern of in-</a:t>
+                </a:r>
+                <a:r>
+                  <a:rPr lang="en-US" dirty="0" smtClean="0"/>
+                  <a:t>out </a:t>
+                </a:r>
+                <a:r>
+                  <a:rPr lang="en-US" dirty="0" smtClean="0"/>
+                  <a:t>should be roughly symmetric</a:t>
+                </a:r>
+              </a:p>
+              <a:p>
+                <a:pPr lvl="1"/>
+                <a:r>
+                  <a:rPr lang="en-US" dirty="0" smtClean="0"/>
+                  <a:t>VOP equations predict </a:t>
+                </a:r>
+                <a14:m>
+                  <m:oMath xmlns:m="http://schemas.openxmlformats.org/officeDocument/2006/math">
+                    <m:f>
+                      <m:fPr>
+                        <m:ctrlPr>
+                          <a:rPr lang="en-US" b="0" i="1" smtClean="0">
+                            <a:latin typeface="Cambria Math"/>
+                          </a:rPr>
+                        </m:ctrlPr>
+                      </m:fPr>
+                      <m:num>
+                        <m:r>
+                          <a:rPr lang="en-US" b="0" i="1" smtClean="0">
+                            <a:latin typeface="Cambria Math"/>
+                          </a:rPr>
+                          <m:t>𝑑</m:t>
+                        </m:r>
+                        <m:r>
+                          <m:rPr>
+                            <m:sty m:val="p"/>
+                          </m:rPr>
+                          <a:rPr lang="en-US" b="0" i="0" smtClean="0">
+                            <a:latin typeface="Cambria Math"/>
+                          </a:rPr>
+                          <m:t>Ω</m:t>
+                        </m:r>
+                      </m:num>
+                      <m:den>
+                        <m:r>
+                          <a:rPr lang="en-US" b="0" i="1" smtClean="0">
+                            <a:latin typeface="Cambria Math"/>
+                          </a:rPr>
+                          <m:t>𝑑𝑡</m:t>
+                        </m:r>
+                      </m:den>
+                    </m:f>
+                    <m:r>
+                      <a:rPr lang="en-US" b="0" i="1" smtClean="0">
+                        <a:latin typeface="Cambria Math"/>
+                      </a:rPr>
+                      <m:t>=−0.5 °/</m:t>
+                    </m:r>
+                    <m:r>
+                      <a:rPr lang="en-US" b="0" i="1" smtClean="0">
+                        <a:latin typeface="Cambria Math"/>
+                      </a:rPr>
+                      <m:t>𝑑𝑎𝑦</m:t>
+                    </m:r>
+                  </m:oMath>
+                </a14:m>
+                <a:r>
+                  <a:rPr lang="en-US" dirty="0"/>
+                  <a:t> (osculating value closer to </a:t>
+                </a:r>
+                <a14:m>
+                  <m:oMath xmlns:m="http://schemas.openxmlformats.org/officeDocument/2006/math">
+                    <m:r>
+                      <a:rPr lang="en-US" b="0" i="1" smtClean="0">
+                        <a:latin typeface="Cambria Math"/>
+                      </a:rPr>
+                      <m:t>−1°/</m:t>
+                    </m:r>
+                    <m:r>
+                      <a:rPr lang="en-US" b="0" i="1" smtClean="0">
+                        <a:latin typeface="Cambria Math"/>
+                      </a:rPr>
+                      <m:t>𝑑𝑎𝑦</m:t>
+                    </m:r>
+                  </m:oMath>
+                </a14:m>
+                <a:r>
+                  <a:rPr lang="en-US" dirty="0" smtClean="0"/>
+                  <a:t>) for </a:t>
+                </a:r>
+                <a:r>
+                  <a:rPr lang="en-US" dirty="0"/>
+                  <a:t>a total movement in SMLT of about </a:t>
+                </a:r>
+                <a14:m>
+                  <m:oMath xmlns:m="http://schemas.openxmlformats.org/officeDocument/2006/math">
+                    <m:r>
+                      <a:rPr lang="en-US" b="0" i="1" smtClean="0">
+                        <a:latin typeface="Cambria Math"/>
+                      </a:rPr>
+                      <m:t>1.5 °/</m:t>
+                    </m:r>
+                    <m:r>
+                      <a:rPr lang="en-US" b="0" i="1" smtClean="0">
+                        <a:latin typeface="Cambria Math"/>
+                      </a:rPr>
+                      <m:t>𝑑𝑎𝑦</m:t>
+                    </m:r>
+                  </m:oMath>
+                </a14:m>
+                <a:endParaRPr lang="en-US" dirty="0" smtClean="0"/>
+              </a:p>
+              <a:p>
+                <a:pPr lvl="1"/>
+                <a:r>
+                  <a:rPr lang="en-US" dirty="0" smtClean="0"/>
+                  <a:t>Therefore about 2 months in followed by 2 months out and so on </a:t>
+                </a:r>
+              </a:p>
+              <a:p>
+                <a:pPr lvl="1"/>
+                <a:r>
+                  <a:rPr lang="en-US" dirty="0" smtClean="0"/>
+                  <a:t>This pattern is seen in the data</a:t>
+                </a:r>
+                <a:endParaRPr lang="en-US" dirty="0" smtClean="0"/>
+              </a:p>
+              <a:p>
+                <a:pPr marL="57150" indent="0">
+                  <a:buNone/>
+                </a:pPr>
                 <a:endParaRPr lang="en-US" dirty="0" smtClean="0"/>
               </a:p>
               <a:p>
@@ -4697,7 +4804,7 @@
               <a:blipFill rotWithShape="1">
                 <a:blip r:embed="rId2"/>
                 <a:stretch>
-                  <a:fillRect l="-857" t="-1752" r="-1857"/>
+                  <a:fillRect t="-809" r="-429"/>
                 </a:stretch>
               </a:blipFill>
             </p:spPr>
@@ -4942,8 +5049,8 @@
             <a:noFill/>
           </p:spPr>
         </p:pic>
-        <mc:AlternateContent xmlns:mc="http://schemas.openxmlformats.org/markup-compatibility/2006">
-          <mc:Choice xmlns:a14="http://schemas.microsoft.com/office/drawing/2010/main" Requires="a14">
+        <mc:AlternateContent xmlns:mc="http://schemas.openxmlformats.org/markup-compatibility/2006" xmlns:a14="http://schemas.microsoft.com/office/drawing/2010/main">
+          <mc:Choice Requires="a14">
             <p:sp>
               <p:nvSpPr>
                 <p:cNvPr id="12" name="TextBox 11"/>
@@ -4966,6 +5073,7 @@
                 </a:bodyPr>
                 <a:lstStyle/>
                 <a:p>
+                  <a:pPr/>
                   <a14:m>
                     <m:oMathPara xmlns:m="http://schemas.openxmlformats.org/officeDocument/2006/math">
                       <m:oMathParaPr>
@@ -5008,7 +5116,7 @@
               </p:txBody>
             </p:sp>
           </mc:Choice>
-          <mc:Fallback>
+          <mc:Fallback xmlns="">
             <p:sp>
               <p:nvSpPr>
                 <p:cNvPr id="12" name="TextBox 11"/>
@@ -5135,8 +5243,8 @@
           </p:style>
         </p:cxnSp>
       </p:grpSp>
-      <mc:AlternateContent xmlns:mc="http://schemas.openxmlformats.org/markup-compatibility/2006">
-        <mc:Choice xmlns:a14="http://schemas.microsoft.com/office/drawing/2010/main" Requires="a14">
+      <mc:AlternateContent xmlns:mc="http://schemas.openxmlformats.org/markup-compatibility/2006" xmlns:a14="http://schemas.microsoft.com/office/drawing/2010/main">
+        <mc:Choice Requires="a14">
           <p:sp>
             <p:nvSpPr>
               <p:cNvPr id="22" name="Rectangle 21"/>
@@ -5158,6 +5266,7 @@
               </a:bodyPr>
               <a:lstStyle/>
               <a:p>
+                <a:pPr/>
                 <a14:m>
                   <m:oMathPara xmlns:m="http://schemas.openxmlformats.org/officeDocument/2006/math">
                     <m:oMathParaPr>
@@ -5221,7 +5330,7 @@
             </p:txBody>
           </p:sp>
         </mc:Choice>
-        <mc:Fallback>
+        <mc:Fallback xmlns="">
           <p:sp>
             <p:nvSpPr>
               <p:cNvPr id="22" name="Rectangle 21"/>
@@ -5260,8 +5369,8 @@
           </p:sp>
         </mc:Fallback>
       </mc:AlternateContent>
-      <mc:AlternateContent xmlns:mc="http://schemas.openxmlformats.org/markup-compatibility/2006">
-        <mc:Choice xmlns:a14="http://schemas.microsoft.com/office/drawing/2010/main" Requires="a14">
+      <mc:AlternateContent xmlns:mc="http://schemas.openxmlformats.org/markup-compatibility/2006" xmlns:a14="http://schemas.microsoft.com/office/drawing/2010/main">
+        <mc:Choice Requires="a14">
           <p:sp>
             <p:nvSpPr>
               <p:cNvPr id="24" name="Rectangle 23"/>
@@ -5283,6 +5392,7 @@
               </a:bodyPr>
               <a:lstStyle/>
               <a:p>
+                <a:pPr/>
                 <a14:m>
                   <m:oMathPara xmlns:m="http://schemas.openxmlformats.org/officeDocument/2006/math">
                     <m:oMathParaPr>
@@ -5346,7 +5456,7 @@
             </p:txBody>
           </p:sp>
         </mc:Choice>
-        <mc:Fallback>
+        <mc:Fallback xmlns="">
           <p:sp>
             <p:nvSpPr>
               <p:cNvPr id="24" name="Rectangle 23"/>
@@ -5619,8 +5729,8 @@
           </a:p>
         </p:txBody>
       </p:sp>
-      <mc:AlternateContent xmlns:mc="http://schemas.openxmlformats.org/markup-compatibility/2006">
-        <mc:Choice xmlns:a14="http://schemas.microsoft.com/office/drawing/2010/main" Requires="a14">
+      <mc:AlternateContent xmlns:mc="http://schemas.openxmlformats.org/markup-compatibility/2006" xmlns:a14="http://schemas.microsoft.com/office/drawing/2010/main">
+        <mc:Choice Requires="a14">
           <p:sp>
             <p:nvSpPr>
               <p:cNvPr id="43" name="TextBox 42"/>
@@ -5643,6 +5753,7 @@
               </a:bodyPr>
               <a:lstStyle/>
               <a:p>
+                <a:pPr/>
                 <a14:m>
                   <m:oMathPara xmlns:m="http://schemas.openxmlformats.org/officeDocument/2006/math">
                     <m:oMathParaPr>
@@ -5685,7 +5796,7 @@
             </p:txBody>
           </p:sp>
         </mc:Choice>
-        <mc:Fallback>
+        <mc:Fallback xmlns="">
           <p:sp>
             <p:nvSpPr>
               <p:cNvPr id="43" name="TextBox 42"/>
@@ -6016,6 +6127,1046 @@
     <p:extLst>
       <p:ext uri="{BB962C8B-B14F-4D97-AF65-F5344CB8AC3E}">
         <p14:creationId xmlns:p14="http://schemas.microsoft.com/office/powerpoint/2010/main" val="52025418"/>
+      </p:ext>
+    </p:extLst>
+  </p:cSld>
+  <p:clrMapOvr>
+    <a:masterClrMapping/>
+  </p:clrMapOvr>
+</p:sld>
+</file>
+
+<file path=ppt/slides/slide5.xml><?xml version="1.0" encoding="utf-8"?>
+<p:sld xmlns:a="http://schemas.openxmlformats.org/drawingml/2006/main" xmlns:r="http://schemas.openxmlformats.org/officeDocument/2006/relationships" xmlns:p="http://schemas.openxmlformats.org/presentationml/2006/main">
+  <p:cSld>
+    <p:spTree>
+      <p:nvGrpSpPr>
+        <p:cNvPr id="1" name=""/>
+        <p:cNvGrpSpPr/>
+        <p:nvPr/>
+      </p:nvGrpSpPr>
+      <p:grpSpPr>
+        <a:xfrm>
+          <a:off x="0" y="0"/>
+          <a:ext cx="0" cy="0"/>
+          <a:chOff x="0" y="0"/>
+          <a:chExt cx="0" cy="0"/>
+        </a:xfrm>
+      </p:grpSpPr>
+      <p:sp>
+        <p:nvSpPr>
+          <p:cNvPr id="2" name="Title 1"/>
+          <p:cNvSpPr>
+            <a:spLocks noGrp="1"/>
+          </p:cNvSpPr>
+          <p:nvPr>
+            <p:ph type="title"/>
+          </p:nvPr>
+        </p:nvSpPr>
+        <p:spPr>
+          <a:xfrm>
+            <a:off x="457200" y="274638"/>
+            <a:ext cx="8229600" cy="487362"/>
+          </a:xfrm>
+        </p:spPr>
+        <p:txBody>
+          <a:bodyPr>
+            <a:noAutofit/>
+          </a:bodyPr>
+          <a:lstStyle/>
+          <a:p>
+            <a:r>
+              <a:rPr lang="en-US" sz="3200" dirty="0" smtClean="0"/>
+              <a:t>Other Sanity Checks and Other Considerations</a:t>
+            </a:r>
+            <a:endParaRPr lang="en-US" sz="3200" dirty="0"/>
+          </a:p>
+        </p:txBody>
+      </p:sp>
+      <mc:AlternateContent xmlns:mc="http://schemas.openxmlformats.org/markup-compatibility/2006">
+        <mc:Choice xmlns:a14="http://schemas.microsoft.com/office/drawing/2010/main" Requires="a14">
+          <p:sp>
+            <p:nvSpPr>
+              <p:cNvPr id="3" name="Content Placeholder 2"/>
+              <p:cNvSpPr>
+                <a:spLocks noGrp="1"/>
+              </p:cNvSpPr>
+              <p:nvPr>
+                <p:ph idx="1"/>
+              </p:nvPr>
+            </p:nvSpPr>
+            <p:spPr>
+              <a:xfrm>
+                <a:off x="457200" y="990600"/>
+                <a:ext cx="4724400" cy="5135563"/>
+              </a:xfrm>
+            </p:spPr>
+            <p:txBody>
+              <a:bodyPr>
+                <a:normAutofit fontScale="92500" lnSpcReduction="20000"/>
+              </a:bodyPr>
+              <a:lstStyle/>
+              <a:p>
+                <a:r>
+                  <a:rPr lang="en-US" sz="1600" dirty="0" smtClean="0"/>
+                  <a:t>IMAGE true anomaly computations compared against </a:t>
+                </a:r>
+                <a:r>
+                  <a:rPr lang="en-US" sz="1600" dirty="0" err="1" smtClean="0"/>
+                  <a:t>FreeFlyer</a:t>
+                </a:r>
+                <a:r>
+                  <a:rPr lang="en-US" sz="1600" dirty="0" smtClean="0"/>
+                  <a:t> and found correct (</a:t>
+                </a:r>
+                <a14:m>
+                  <m:oMath xmlns:m="http://schemas.openxmlformats.org/officeDocument/2006/math">
+                    <m:sSub>
+                      <m:sSubPr>
+                        <m:ctrlPr>
+                          <a:rPr lang="en-US" sz="1600" b="0" i="1" smtClean="0">
+                            <a:latin typeface="Cambria Math"/>
+                          </a:rPr>
+                        </m:ctrlPr>
+                      </m:sSubPr>
+                      <m:e>
+                        <m:r>
+                          <a:rPr lang="en-US" sz="1600" b="0" i="1" smtClean="0">
+                            <a:latin typeface="Cambria Math"/>
+                          </a:rPr>
+                          <m:t>𝜈</m:t>
+                        </m:r>
+                      </m:e>
+                      <m:sub>
+                        <m:r>
+                          <a:rPr lang="en-US" sz="1600" b="0" i="1" smtClean="0">
+                            <a:latin typeface="Cambria Math"/>
+                          </a:rPr>
+                          <m:t>𝐹𝐹</m:t>
+                        </m:r>
+                      </m:sub>
+                    </m:sSub>
+                    <m:r>
+                      <a:rPr lang="en-US" sz="1600" b="0" i="1" smtClean="0">
+                        <a:latin typeface="Cambria Math"/>
+                      </a:rPr>
+                      <m:t>=227 °=</m:t>
+                    </m:r>
+                    <m:d>
+                      <m:dPr>
+                        <m:ctrlPr>
+                          <a:rPr lang="en-US" sz="1600" b="0" i="1" smtClean="0">
+                            <a:latin typeface="Cambria Math"/>
+                          </a:rPr>
+                        </m:ctrlPr>
+                      </m:dPr>
+                      <m:e>
+                        <m:r>
+                          <a:rPr lang="en-US" sz="1600" b="0" i="1" smtClean="0">
+                            <a:latin typeface="Cambria Math"/>
+                          </a:rPr>
+                          <m:t>180+47</m:t>
+                        </m:r>
+                      </m:e>
+                    </m:d>
+                    <m:r>
+                      <a:rPr lang="en-US" sz="1600" b="0" i="1" smtClean="0">
+                        <a:latin typeface="Cambria Math"/>
+                      </a:rPr>
+                      <m:t>°</m:t>
+                    </m:r>
+                  </m:oMath>
+                </a14:m>
+                <a:r>
+                  <a:rPr lang="en-US" sz="1600" dirty="0" smtClean="0"/>
+                  <a:t> versus </a:t>
+                </a:r>
+                <a14:m>
+                  <m:oMath xmlns:m="http://schemas.openxmlformats.org/officeDocument/2006/math">
+                    <m:r>
+                      <a:rPr lang="en-US" sz="1600" b="0" i="1" smtClean="0">
+                        <a:latin typeface="Cambria Math"/>
+                      </a:rPr>
+                      <m:t>𝜏</m:t>
+                    </m:r>
+                    <m:r>
+                      <a:rPr lang="en-US" sz="1600" b="0" i="1" smtClean="0">
+                        <a:latin typeface="Cambria Math"/>
+                      </a:rPr>
+                      <m:t>=47°</m:t>
+                    </m:r>
+                  </m:oMath>
+                </a14:m>
+                <a:r>
+                  <a:rPr lang="en-US" sz="1600" dirty="0" smtClean="0"/>
+                  <a:t> </a:t>
+                </a:r>
+                <a:r>
+                  <a:rPr lang="en-US" sz="1600" dirty="0"/>
+                  <a:t>in </a:t>
+                </a:r>
+                <a:r>
+                  <a:rPr lang="en-US" sz="1600" i="1" dirty="0" err="1" smtClean="0"/>
+                  <a:t>IMAGE_Apogee_Viewing_Times_Generation.ipynb</a:t>
+                </a:r>
+                <a:endParaRPr lang="en-US" sz="1600" i="1" dirty="0" smtClean="0"/>
+              </a:p>
+              <a:p>
+                <a:endParaRPr lang="en-US" sz="1600" dirty="0" smtClean="0"/>
+              </a:p>
+              <a:p>
+                <a:r>
+                  <a:rPr lang="en-US" sz="1600" dirty="0" smtClean="0"/>
+                  <a:t>FAST angular momentum computations all </a:t>
+                </a:r>
+                <a:r>
+                  <a:rPr lang="en-US" sz="1600" dirty="0"/>
+                  <a:t>found correct in </a:t>
+                </a:r>
+                <a:r>
+                  <a:rPr lang="en-US" sz="1600" i="1" dirty="0" err="1" smtClean="0"/>
+                  <a:t>FAST_local_time_generation.ipynb</a:t>
+                </a:r>
+                <a:endParaRPr lang="en-US" sz="1600" i="1" dirty="0" smtClean="0"/>
+              </a:p>
+              <a:p>
+                <a:pPr lvl="1"/>
+                <a:r>
+                  <a:rPr lang="en-US" sz="1200" dirty="0" smtClean="0"/>
+                  <a:t>compared against </a:t>
+                </a:r>
+                <a:r>
+                  <a:rPr lang="en-US" sz="1200" dirty="0" err="1" smtClean="0"/>
+                  <a:t>FreeFlyer</a:t>
+                </a:r>
+                <a:r>
+                  <a:rPr lang="en-US" sz="1200" dirty="0" smtClean="0"/>
+                  <a:t> </a:t>
+                </a:r>
+              </a:p>
+              <a:p>
+                <a:pPr lvl="1"/>
+                <a:r>
+                  <a:rPr lang="en-US" sz="1200" dirty="0" smtClean="0"/>
+                  <a:t>conversion from ECI to SM compared against MMS MEC file</a:t>
+                </a:r>
+              </a:p>
+              <a:p>
+                <a:pPr lvl="1"/>
+                <a:r>
+                  <a:rPr lang="en-US" sz="1200" dirty="0" smtClean="0"/>
+                  <a:t>Application of SM and LT conversions compared against simple analytic model</a:t>
+                </a:r>
+              </a:p>
+              <a:p>
+                <a:endParaRPr lang="en-US" sz="1600" dirty="0"/>
+              </a:p>
+              <a:p>
+                <a:r>
+                  <a:rPr lang="en-US" sz="1600" dirty="0" smtClean="0"/>
+                  <a:t>No rule given at the 11/10/16 </a:t>
+                </a:r>
+                <a:r>
+                  <a:rPr lang="en-US" sz="1600" dirty="0" err="1" smtClean="0"/>
+                  <a:t>tagup</a:t>
+                </a:r>
+                <a:r>
+                  <a:rPr lang="en-US" sz="1600" dirty="0" smtClean="0"/>
+                  <a:t> about the argument of perigee for FAST (i.e. is it’s apogee in the Northern hemisphere).  Working on adding that.  Also no rule about ascending versus descending node – </a:t>
+                </a:r>
+                <a:r>
+                  <a:rPr lang="en-US" sz="1600" smtClean="0"/>
+                  <a:t>gave both.</a:t>
+                </a:r>
+                <a:endParaRPr lang="en-US" sz="1600" dirty="0" smtClean="0"/>
+              </a:p>
+              <a:p>
+                <a:endParaRPr lang="en-US" sz="1600" dirty="0"/>
+              </a:p>
+              <a:p>
+                <a:r>
+                  <a:rPr lang="en-US" sz="1600" dirty="0" smtClean="0"/>
+                  <a:t>Date and time format not selected so I opted for Python’s </a:t>
+                </a:r>
+                <a:r>
+                  <a:rPr lang="en-US" sz="1600" dirty="0" err="1" smtClean="0"/>
+                  <a:t>datetime</a:t>
+                </a:r>
+                <a:r>
+                  <a:rPr lang="en-US" sz="1600" dirty="0" smtClean="0"/>
+                  <a:t> default</a:t>
+                </a:r>
+              </a:p>
+              <a:p>
+                <a:pPr lvl="1"/>
+                <a:r>
+                  <a:rPr lang="en-US" sz="1200" dirty="0" smtClean="0"/>
+                  <a:t>Easily changed</a:t>
+                </a:r>
+              </a:p>
+              <a:p>
+                <a:endParaRPr lang="en-US" sz="1600" dirty="0" smtClean="0"/>
+              </a:p>
+              <a:p>
+                <a:r>
+                  <a:rPr lang="en-US" sz="1600" dirty="0" smtClean="0"/>
+                  <a:t>Finally, over 1800 view opportunities on IMAGE contained within 17 FAST viewing opportunities (see accompanying spreadsheet)</a:t>
+                </a:r>
+                <a:endParaRPr lang="en-US" sz="1600" dirty="0"/>
+              </a:p>
+            </p:txBody>
+          </p:sp>
+        </mc:Choice>
+        <mc:Fallback>
+          <p:sp>
+            <p:nvSpPr>
+              <p:cNvPr id="3" name="Content Placeholder 2"/>
+              <p:cNvSpPr>
+                <a:spLocks noGrp="1" noRot="1" noChangeAspect="1" noMove="1" noResize="1" noEditPoints="1" noAdjustHandles="1" noChangeArrowheads="1" noChangeShapeType="1" noTextEdit="1"/>
+              </p:cNvSpPr>
+              <p:nvPr>
+                <p:ph idx="1"/>
+              </p:nvPr>
+            </p:nvSpPr>
+            <p:spPr>
+              <a:xfrm>
+                <a:off x="457200" y="990600"/>
+                <a:ext cx="4724400" cy="5135563"/>
+              </a:xfrm>
+              <a:blipFill rotWithShape="1">
+                <a:blip r:embed="rId2"/>
+                <a:stretch>
+                  <a:fillRect l="-258" t="-950" r="-387"/>
+                </a:stretch>
+              </a:blipFill>
+            </p:spPr>
+            <p:txBody>
+              <a:bodyPr/>
+              <a:lstStyle/>
+              <a:p>
+                <a:r>
+                  <a:rPr lang="en-US">
+                    <a:noFill/>
+                  </a:rPr>
+                  <a:t> </a:t>
+                </a:r>
+              </a:p>
+            </p:txBody>
+          </p:sp>
+        </mc:Fallback>
+      </mc:AlternateContent>
+      <p:cxnSp>
+        <p:nvCxnSpPr>
+          <p:cNvPr id="4" name="Straight Arrow Connector 3"/>
+          <p:cNvCxnSpPr>
+            <a:endCxn id="6" idx="0"/>
+          </p:cNvCxnSpPr>
+          <p:nvPr/>
+        </p:nvCxnSpPr>
+        <p:spPr>
+          <a:xfrm flipV="1">
+            <a:off x="7048500" y="1944872"/>
+            <a:ext cx="783905" cy="3408948"/>
+          </a:xfrm>
+          <a:prstGeom prst="straightConnector1">
+            <a:avLst/>
+          </a:prstGeom>
+          <a:ln>
+            <a:solidFill>
+              <a:srgbClr val="FF0000"/>
+            </a:solidFill>
+            <a:tailEnd type="arrow"/>
+          </a:ln>
+        </p:spPr>
+        <p:style>
+          <a:lnRef idx="1">
+            <a:schemeClr val="accent1"/>
+          </a:lnRef>
+          <a:fillRef idx="0">
+            <a:schemeClr val="accent1"/>
+          </a:fillRef>
+          <a:effectRef idx="0">
+            <a:schemeClr val="accent1"/>
+          </a:effectRef>
+          <a:fontRef idx="minor">
+            <a:schemeClr val="tx1"/>
+          </a:fontRef>
+        </p:style>
+      </p:cxnSp>
+      <p:pic>
+        <p:nvPicPr>
+          <p:cNvPr id="5" name="Picture 2" descr="C:\Users\cschiff\AppData\Local\Microsoft\Windows\INetCache\IE\URPDBZBJ\16897-illustration-of-a-globe-pv[1].png"/>
+          <p:cNvPicPr>
+            <a:picLocks noChangeAspect="1" noChangeArrowheads="1"/>
+          </p:cNvPicPr>
+          <p:nvPr/>
+        </p:nvPicPr>
+        <p:blipFill>
+          <a:blip r:embed="rId3" cstate="print"/>
+          <a:srcRect/>
+          <a:stretch>
+            <a:fillRect/>
+          </a:stretch>
+        </p:blipFill>
+        <p:spPr bwMode="auto">
+          <a:xfrm>
+            <a:off x="6477000" y="4852685"/>
+            <a:ext cx="1143000" cy="1143000"/>
+          </a:xfrm>
+          <a:prstGeom prst="rect">
+            <a:avLst/>
+          </a:prstGeom>
+          <a:noFill/>
+        </p:spPr>
+      </p:pic>
+      <p:sp>
+        <p:nvSpPr>
+          <p:cNvPr id="6" name="Oval 5"/>
+          <p:cNvSpPr/>
+          <p:nvPr/>
+        </p:nvSpPr>
+        <p:spPr>
+          <a:xfrm rot="786334">
+            <a:off x="6481576" y="1887108"/>
+            <a:ext cx="1695928" cy="4435496"/>
+          </a:xfrm>
+          <a:prstGeom prst="ellipse">
+            <a:avLst/>
+          </a:prstGeom>
+          <a:noFill/>
+          <a:ln>
+            <a:solidFill>
+              <a:srgbClr val="FF0000"/>
+            </a:solidFill>
+          </a:ln>
+        </p:spPr>
+        <p:style>
+          <a:lnRef idx="2">
+            <a:schemeClr val="accent1">
+              <a:shade val="50000"/>
+            </a:schemeClr>
+          </a:lnRef>
+          <a:fillRef idx="1">
+            <a:schemeClr val="accent1"/>
+          </a:fillRef>
+          <a:effectRef idx="0">
+            <a:schemeClr val="accent1"/>
+          </a:effectRef>
+          <a:fontRef idx="minor">
+            <a:schemeClr val="lt1"/>
+          </a:fontRef>
+        </p:style>
+        <p:txBody>
+          <a:bodyPr rtlCol="0" anchor="ctr"/>
+          <a:lstStyle/>
+          <a:p>
+            <a:pPr algn="ctr"/>
+            <a:endParaRPr lang="en-US" dirty="0">
+              <a:solidFill>
+                <a:srgbClr val="00B0F0"/>
+              </a:solidFill>
+            </a:endParaRPr>
+          </a:p>
+        </p:txBody>
+      </p:sp>
+      <p:sp>
+        <p:nvSpPr>
+          <p:cNvPr id="7" name="TextBox 6"/>
+          <p:cNvSpPr txBox="1"/>
+          <p:nvPr/>
+        </p:nvSpPr>
+        <p:spPr>
+          <a:xfrm>
+            <a:off x="7239000" y="6148085"/>
+            <a:ext cx="1366015" cy="369332"/>
+          </a:xfrm>
+          <a:prstGeom prst="rect">
+            <a:avLst/>
+          </a:prstGeom>
+          <a:noFill/>
+        </p:spPr>
+        <p:txBody>
+          <a:bodyPr wrap="none" rtlCol="0">
+            <a:spAutoFit/>
+          </a:bodyPr>
+          <a:lstStyle/>
+          <a:p>
+            <a:r>
+              <a:rPr lang="en-US" dirty="0" smtClean="0">
+                <a:solidFill>
+                  <a:srgbClr val="FF0000"/>
+                </a:solidFill>
+              </a:rPr>
+              <a:t>IMAGE Orbit</a:t>
+            </a:r>
+            <a:endParaRPr lang="en-US" dirty="0">
+              <a:solidFill>
+                <a:srgbClr val="FF0000"/>
+              </a:solidFill>
+            </a:endParaRPr>
+          </a:p>
+        </p:txBody>
+      </p:sp>
+      <p:cxnSp>
+        <p:nvCxnSpPr>
+          <p:cNvPr id="8" name="Straight Arrow Connector 7"/>
+          <p:cNvCxnSpPr>
+            <a:endCxn id="6" idx="1"/>
+          </p:cNvCxnSpPr>
+          <p:nvPr/>
+        </p:nvCxnSpPr>
+        <p:spPr>
+          <a:xfrm flipV="1">
+            <a:off x="7048500" y="2441559"/>
+            <a:ext cx="52636" cy="2982627"/>
+          </a:xfrm>
+          <a:prstGeom prst="straightConnector1">
+            <a:avLst/>
+          </a:prstGeom>
+          <a:ln>
+            <a:solidFill>
+              <a:srgbClr val="FF0000"/>
+            </a:solidFill>
+            <a:tailEnd type="arrow"/>
+          </a:ln>
+        </p:spPr>
+        <p:style>
+          <a:lnRef idx="1">
+            <a:schemeClr val="accent1"/>
+          </a:lnRef>
+          <a:fillRef idx="0">
+            <a:schemeClr val="accent1"/>
+          </a:fillRef>
+          <a:effectRef idx="0">
+            <a:schemeClr val="accent1"/>
+          </a:effectRef>
+          <a:fontRef idx="minor">
+            <a:schemeClr val="tx1"/>
+          </a:fontRef>
+        </p:style>
+      </p:cxnSp>
+      <p:sp>
+        <p:nvSpPr>
+          <p:cNvPr id="9" name="Arc 8"/>
+          <p:cNvSpPr/>
+          <p:nvPr/>
+        </p:nvSpPr>
+        <p:spPr>
+          <a:xfrm rot="2671008" flipH="1">
+            <a:off x="6971852" y="3771555"/>
+            <a:ext cx="481555" cy="523456"/>
+          </a:xfrm>
+          <a:prstGeom prst="arc">
+            <a:avLst>
+              <a:gd name="adj1" fmla="val 15846082"/>
+              <a:gd name="adj2" fmla="val 20875903"/>
+            </a:avLst>
+          </a:prstGeom>
+          <a:ln>
+            <a:solidFill>
+              <a:srgbClr val="FF0000"/>
+            </a:solidFill>
+          </a:ln>
+        </p:spPr>
+        <p:style>
+          <a:lnRef idx="1">
+            <a:schemeClr val="accent1"/>
+          </a:lnRef>
+          <a:fillRef idx="0">
+            <a:schemeClr val="accent1"/>
+          </a:fillRef>
+          <a:effectRef idx="0">
+            <a:schemeClr val="accent1"/>
+          </a:effectRef>
+          <a:fontRef idx="minor">
+            <a:schemeClr val="tx1"/>
+          </a:fontRef>
+        </p:style>
+        <p:txBody>
+          <a:bodyPr rtlCol="0" anchor="ctr"/>
+          <a:lstStyle/>
+          <a:p>
+            <a:pPr algn="ctr"/>
+            <a:endParaRPr lang="en-US"/>
+          </a:p>
+        </p:txBody>
+      </p:sp>
+      <mc:AlternateContent xmlns:mc="http://schemas.openxmlformats.org/markup-compatibility/2006">
+        <mc:Choice xmlns:a14="http://schemas.microsoft.com/office/drawing/2010/main" Requires="a14">
+          <p:sp>
+            <p:nvSpPr>
+              <p:cNvPr id="10" name="TextBox 9"/>
+              <p:cNvSpPr txBox="1"/>
+              <p:nvPr/>
+            </p:nvSpPr>
+            <p:spPr>
+              <a:xfrm>
+                <a:off x="5181600" y="3649346"/>
+                <a:ext cx="1168724" cy="938515"/>
+              </a:xfrm>
+              <a:prstGeom prst="rect">
+                <a:avLst/>
+              </a:prstGeom>
+              <a:noFill/>
+            </p:spPr>
+            <p:txBody>
+              <a:bodyPr wrap="square" rtlCol="0">
+                <a:spAutoFit/>
+              </a:bodyPr>
+              <a:lstStyle/>
+              <a:p>
+                <a14:m>
+                  <m:oMath xmlns:m="http://schemas.openxmlformats.org/officeDocument/2006/math">
+                    <m:r>
+                      <a:rPr lang="en-US" b="0" i="1" smtClean="0">
+                        <a:solidFill>
+                          <a:srgbClr val="FF0000"/>
+                        </a:solidFill>
+                        <a:latin typeface="Cambria Math"/>
+                      </a:rPr>
+                      <m:t>𝜏</m:t>
+                    </m:r>
+                  </m:oMath>
+                </a14:m>
+                <a:r>
+                  <a:rPr lang="en-US" dirty="0" smtClean="0">
+                    <a:solidFill>
+                      <a:srgbClr val="FF0000"/>
+                    </a:solidFill>
+                  </a:rPr>
+                  <a:t> – angle between </a:t>
+                </a:r>
+                <a14:m>
+                  <m:oMath xmlns:m="http://schemas.openxmlformats.org/officeDocument/2006/math">
+                    <m:r>
+                      <a:rPr lang="en-US" b="0" i="1" smtClean="0">
+                        <a:solidFill>
+                          <a:srgbClr val="FF0000"/>
+                        </a:solidFill>
+                        <a:latin typeface="Cambria Math"/>
+                      </a:rPr>
+                      <m:t>−</m:t>
+                    </m:r>
+                    <m:acc>
+                      <m:accPr>
+                        <m:chr m:val="̂"/>
+                        <m:ctrlPr>
+                          <a:rPr lang="en-US" b="0" i="1" smtClean="0">
+                            <a:solidFill>
+                              <a:srgbClr val="FF0000"/>
+                            </a:solidFill>
+                            <a:latin typeface="Cambria Math"/>
+                          </a:rPr>
+                        </m:ctrlPr>
+                      </m:accPr>
+                      <m:e>
+                        <m:r>
+                          <a:rPr lang="en-US" b="0" i="1" smtClean="0">
+                            <a:solidFill>
+                              <a:srgbClr val="FF0000"/>
+                            </a:solidFill>
+                            <a:latin typeface="Cambria Math"/>
+                          </a:rPr>
+                          <m:t>𝑒</m:t>
+                        </m:r>
+                      </m:e>
+                    </m:acc>
+                    <m:r>
+                      <a:rPr lang="en-US" b="0" i="1" smtClean="0">
+                        <a:solidFill>
+                          <a:srgbClr val="FF0000"/>
+                        </a:solidFill>
+                        <a:latin typeface="Cambria Math"/>
+                      </a:rPr>
+                      <m:t> </m:t>
+                    </m:r>
+                  </m:oMath>
+                </a14:m>
+                <a:r>
+                  <a:rPr lang="en-US" dirty="0" smtClean="0">
+                    <a:solidFill>
+                      <a:srgbClr val="FF0000"/>
+                    </a:solidFill>
+                  </a:rPr>
+                  <a:t> and </a:t>
+                </a:r>
+                <a14:m>
+                  <m:oMath xmlns:m="http://schemas.openxmlformats.org/officeDocument/2006/math">
+                    <m:acc>
+                      <m:accPr>
+                        <m:chr m:val="⃗"/>
+                        <m:ctrlPr>
+                          <a:rPr lang="en-US" b="0" i="1" smtClean="0">
+                            <a:solidFill>
+                              <a:srgbClr val="FF0000"/>
+                            </a:solidFill>
+                            <a:latin typeface="Cambria Math"/>
+                          </a:rPr>
+                        </m:ctrlPr>
+                      </m:accPr>
+                      <m:e>
+                        <m:r>
+                          <a:rPr lang="en-US" b="0" i="1" smtClean="0">
+                            <a:solidFill>
+                              <a:srgbClr val="FF0000"/>
+                            </a:solidFill>
+                            <a:latin typeface="Cambria Math"/>
+                          </a:rPr>
+                          <m:t>𝑟</m:t>
+                        </m:r>
+                      </m:e>
+                    </m:acc>
+                  </m:oMath>
+                </a14:m>
+                <a:endParaRPr lang="en-US" dirty="0">
+                  <a:solidFill>
+                    <a:srgbClr val="FF0000"/>
+                  </a:solidFill>
+                </a:endParaRPr>
+              </a:p>
+            </p:txBody>
+          </p:sp>
+        </mc:Choice>
+        <mc:Fallback>
+          <p:sp>
+            <p:nvSpPr>
+              <p:cNvPr id="10" name="TextBox 9"/>
+              <p:cNvSpPr txBox="1">
+                <a:spLocks noRot="1" noChangeAspect="1" noMove="1" noResize="1" noEditPoints="1" noAdjustHandles="1" noChangeArrowheads="1" noChangeShapeType="1" noTextEdit="1"/>
+              </p:cNvSpPr>
+              <p:nvPr/>
+            </p:nvSpPr>
+            <p:spPr>
+              <a:xfrm>
+                <a:off x="5181600" y="3649346"/>
+                <a:ext cx="1168724" cy="938515"/>
+              </a:xfrm>
+              <a:prstGeom prst="rect">
+                <a:avLst/>
+              </a:prstGeom>
+              <a:blipFill rotWithShape="1">
+                <a:blip r:embed="rId4"/>
+                <a:stretch>
+                  <a:fillRect l="-4167" t="-3247" r="-22396" b="-7792"/>
+                </a:stretch>
+              </a:blipFill>
+            </p:spPr>
+            <p:txBody>
+              <a:bodyPr/>
+              <a:lstStyle/>
+              <a:p>
+                <a:r>
+                  <a:rPr lang="en-US">
+                    <a:noFill/>
+                  </a:rPr>
+                  <a:t> </a:t>
+                </a:r>
+              </a:p>
+            </p:txBody>
+          </p:sp>
+        </mc:Fallback>
+      </mc:AlternateContent>
+      <mc:AlternateContent xmlns:mc="http://schemas.openxmlformats.org/markup-compatibility/2006">
+        <mc:Choice xmlns:a14="http://schemas.microsoft.com/office/drawing/2010/main" Requires="a14">
+          <p:sp>
+            <p:nvSpPr>
+              <p:cNvPr id="11" name="Rectangle 10"/>
+              <p:cNvSpPr/>
+              <p:nvPr/>
+            </p:nvSpPr>
+            <p:spPr>
+              <a:xfrm>
+                <a:off x="7108756" y="3410755"/>
+                <a:ext cx="348300" cy="369332"/>
+              </a:xfrm>
+              <a:prstGeom prst="rect">
+                <a:avLst/>
+              </a:prstGeom>
+            </p:spPr>
+            <p:txBody>
+              <a:bodyPr wrap="none">
+                <a:spAutoFit/>
+              </a:bodyPr>
+              <a:lstStyle/>
+              <a:p>
+                <a:pPr/>
+                <a14:m>
+                  <m:oMathPara xmlns:m="http://schemas.openxmlformats.org/officeDocument/2006/math">
+                    <m:oMathParaPr>
+                      <m:jc m:val="centerGroup"/>
+                    </m:oMathParaPr>
+                    <m:oMath xmlns:m="http://schemas.openxmlformats.org/officeDocument/2006/math">
+                      <m:r>
+                        <a:rPr lang="en-US" i="1">
+                          <a:solidFill>
+                            <a:srgbClr val="FF0000"/>
+                          </a:solidFill>
+                          <a:latin typeface="Cambria Math"/>
+                        </a:rPr>
+                        <m:t>𝜏</m:t>
+                      </m:r>
+                    </m:oMath>
+                  </m:oMathPara>
+                </a14:m>
+                <a:endParaRPr lang="en-US" dirty="0"/>
+              </a:p>
+            </p:txBody>
+          </p:sp>
+        </mc:Choice>
+        <mc:Fallback>
+          <p:sp>
+            <p:nvSpPr>
+              <p:cNvPr id="11" name="Rectangle 10"/>
+              <p:cNvSpPr>
+                <a:spLocks noRot="1" noChangeAspect="1" noMove="1" noResize="1" noEditPoints="1" noAdjustHandles="1" noChangeArrowheads="1" noChangeShapeType="1" noTextEdit="1"/>
+              </p:cNvSpPr>
+              <p:nvPr/>
+            </p:nvSpPr>
+            <p:spPr>
+              <a:xfrm>
+                <a:off x="7108756" y="3410755"/>
+                <a:ext cx="348300" cy="369332"/>
+              </a:xfrm>
+              <a:prstGeom prst="rect">
+                <a:avLst/>
+              </a:prstGeom>
+              <a:blipFill rotWithShape="1">
+                <a:blip r:embed="rId5"/>
+                <a:stretch>
+                  <a:fillRect/>
+                </a:stretch>
+              </a:blipFill>
+            </p:spPr>
+            <p:txBody>
+              <a:bodyPr/>
+              <a:lstStyle/>
+              <a:p>
+                <a:r>
+                  <a:rPr lang="en-US">
+                    <a:noFill/>
+                  </a:rPr>
+                  <a:t> </a:t>
+                </a:r>
+              </a:p>
+            </p:txBody>
+          </p:sp>
+        </mc:Fallback>
+      </mc:AlternateContent>
+      <mc:AlternateContent xmlns:mc="http://schemas.openxmlformats.org/markup-compatibility/2006">
+        <mc:Choice xmlns:a14="http://schemas.microsoft.com/office/drawing/2010/main" Requires="a14">
+          <p:sp>
+            <p:nvSpPr>
+              <p:cNvPr id="12" name="Rectangle 11"/>
+              <p:cNvSpPr/>
+              <p:nvPr/>
+            </p:nvSpPr>
+            <p:spPr>
+              <a:xfrm>
+                <a:off x="7076558" y="3048000"/>
+                <a:ext cx="529568" cy="369332"/>
+              </a:xfrm>
+              <a:prstGeom prst="rect">
+                <a:avLst/>
+              </a:prstGeom>
+            </p:spPr>
+            <p:txBody>
+              <a:bodyPr wrap="none">
+                <a:spAutoFit/>
+              </a:bodyPr>
+              <a:lstStyle/>
+              <a:p>
+                <a:pPr/>
+                <a14:m>
+                  <m:oMathPara xmlns:m="http://schemas.openxmlformats.org/officeDocument/2006/math">
+                    <m:oMathParaPr>
+                      <m:jc m:val="centerGroup"/>
+                    </m:oMathParaPr>
+                    <m:oMath xmlns:m="http://schemas.openxmlformats.org/officeDocument/2006/math">
+                      <m:r>
+                        <a:rPr lang="en-US" i="1" smtClean="0">
+                          <a:solidFill>
+                            <a:srgbClr val="FF0000"/>
+                          </a:solidFill>
+                          <a:latin typeface="Cambria Math"/>
+                        </a:rPr>
+                        <m:t>−</m:t>
+                      </m:r>
+                      <m:acc>
+                        <m:accPr>
+                          <m:chr m:val="⃗"/>
+                          <m:ctrlPr>
+                            <a:rPr lang="en-US" b="0" i="1" smtClean="0">
+                              <a:solidFill>
+                                <a:srgbClr val="FF0000"/>
+                              </a:solidFill>
+                              <a:latin typeface="Cambria Math"/>
+                            </a:rPr>
+                          </m:ctrlPr>
+                        </m:accPr>
+                        <m:e>
+                          <m:r>
+                            <a:rPr lang="en-US" b="0" i="1" smtClean="0">
+                              <a:solidFill>
+                                <a:srgbClr val="FF0000"/>
+                              </a:solidFill>
+                              <a:latin typeface="Cambria Math"/>
+                            </a:rPr>
+                            <m:t>𝑒</m:t>
+                          </m:r>
+                        </m:e>
+                      </m:acc>
+                    </m:oMath>
+                  </m:oMathPara>
+                </a14:m>
+                <a:endParaRPr lang="en-US" dirty="0"/>
+              </a:p>
+            </p:txBody>
+          </p:sp>
+        </mc:Choice>
+        <mc:Fallback>
+          <p:sp>
+            <p:nvSpPr>
+              <p:cNvPr id="12" name="Rectangle 11"/>
+              <p:cNvSpPr>
+                <a:spLocks noRot="1" noChangeAspect="1" noMove="1" noResize="1" noEditPoints="1" noAdjustHandles="1" noChangeArrowheads="1" noChangeShapeType="1" noTextEdit="1"/>
+              </p:cNvSpPr>
+              <p:nvPr/>
+            </p:nvSpPr>
+            <p:spPr>
+              <a:xfrm>
+                <a:off x="7076558" y="3048000"/>
+                <a:ext cx="529568" cy="369332"/>
+              </a:xfrm>
+              <a:prstGeom prst="rect">
+                <a:avLst/>
+              </a:prstGeom>
+              <a:blipFill rotWithShape="1">
+                <a:blip r:embed="rId6"/>
+                <a:stretch>
+                  <a:fillRect t="-22951" r="-49425"/>
+                </a:stretch>
+              </a:blipFill>
+            </p:spPr>
+            <p:txBody>
+              <a:bodyPr/>
+              <a:lstStyle/>
+              <a:p>
+                <a:r>
+                  <a:rPr lang="en-US">
+                    <a:noFill/>
+                  </a:rPr>
+                  <a:t> </a:t>
+                </a:r>
+              </a:p>
+            </p:txBody>
+          </p:sp>
+        </mc:Fallback>
+      </mc:AlternateContent>
+      <mc:AlternateContent xmlns:mc="http://schemas.openxmlformats.org/markup-compatibility/2006">
+        <mc:Choice xmlns:a14="http://schemas.microsoft.com/office/drawing/2010/main" Requires="a14">
+          <p:sp>
+            <p:nvSpPr>
+              <p:cNvPr id="13" name="Rectangle 12"/>
+              <p:cNvSpPr/>
+              <p:nvPr/>
+            </p:nvSpPr>
+            <p:spPr>
+              <a:xfrm>
+                <a:off x="6681625" y="3663952"/>
+                <a:ext cx="351635" cy="369332"/>
+              </a:xfrm>
+              <a:prstGeom prst="rect">
+                <a:avLst/>
+              </a:prstGeom>
+            </p:spPr>
+            <p:txBody>
+              <a:bodyPr wrap="none">
+                <a:spAutoFit/>
+              </a:bodyPr>
+              <a:lstStyle/>
+              <a:p>
+                <a:pPr/>
+                <a14:m>
+                  <m:oMathPara xmlns:m="http://schemas.openxmlformats.org/officeDocument/2006/math">
+                    <m:oMathParaPr>
+                      <m:jc m:val="centerGroup"/>
+                    </m:oMathParaPr>
+                    <m:oMath xmlns:m="http://schemas.openxmlformats.org/officeDocument/2006/math">
+                      <m:acc>
+                        <m:accPr>
+                          <m:chr m:val="⃗"/>
+                          <m:ctrlPr>
+                            <a:rPr lang="en-US" i="1">
+                              <a:solidFill>
+                                <a:srgbClr val="FF0000"/>
+                              </a:solidFill>
+                              <a:latin typeface="Cambria Math"/>
+                            </a:rPr>
+                          </m:ctrlPr>
+                        </m:accPr>
+                        <m:e>
+                          <m:r>
+                            <a:rPr lang="en-US" i="1">
+                              <a:solidFill>
+                                <a:srgbClr val="FF0000"/>
+                              </a:solidFill>
+                              <a:latin typeface="Cambria Math"/>
+                            </a:rPr>
+                            <m:t>𝑟</m:t>
+                          </m:r>
+                        </m:e>
+                      </m:acc>
+                    </m:oMath>
+                  </m:oMathPara>
+                </a14:m>
+                <a:endParaRPr lang="en-US" dirty="0"/>
+              </a:p>
+            </p:txBody>
+          </p:sp>
+        </mc:Choice>
+        <mc:Fallback>
+          <p:sp>
+            <p:nvSpPr>
+              <p:cNvPr id="13" name="Rectangle 12"/>
+              <p:cNvSpPr>
+                <a:spLocks noRot="1" noChangeAspect="1" noMove="1" noResize="1" noEditPoints="1" noAdjustHandles="1" noChangeArrowheads="1" noChangeShapeType="1" noTextEdit="1"/>
+              </p:cNvSpPr>
+              <p:nvPr/>
+            </p:nvSpPr>
+            <p:spPr>
+              <a:xfrm>
+                <a:off x="6681625" y="3663952"/>
+                <a:ext cx="351635" cy="369332"/>
+              </a:xfrm>
+              <a:prstGeom prst="rect">
+                <a:avLst/>
+              </a:prstGeom>
+              <a:blipFill rotWithShape="1">
+                <a:blip r:embed="rId7"/>
+                <a:stretch>
+                  <a:fillRect t="-22951" r="-27586"/>
+                </a:stretch>
+              </a:blipFill>
+            </p:spPr>
+            <p:txBody>
+              <a:bodyPr/>
+              <a:lstStyle/>
+              <a:p>
+                <a:r>
+                  <a:rPr lang="en-US">
+                    <a:noFill/>
+                  </a:rPr>
+                  <a:t> </a:t>
+                </a:r>
+              </a:p>
+            </p:txBody>
+          </p:sp>
+        </mc:Fallback>
+      </mc:AlternateContent>
+    </p:spTree>
+    <p:extLst>
+      <p:ext uri="{BB962C8B-B14F-4D97-AF65-F5344CB8AC3E}">
+        <p14:creationId xmlns:p14="http://schemas.microsoft.com/office/powerpoint/2010/main" val="2568095817"/>
       </p:ext>
     </p:extLst>
   </p:cSld>

</xml_diff>